<commit_message>
finished presentation and book for the meeting with Amir
</commit_message>
<xml_diff>
--- a/Docs/Project_601.pptx
+++ b/Docs/Project_601.pptx
@@ -8178,7 +8178,7 @@
           <a:p>
             <a:fld id="{B3B7A677-FBB3-1E46-8BD0-0AD2CBC8FEDE}" type="datetimeFigureOut">
               <a:rPr lang="en-IL" smtClean="0"/>
-              <a:t>04/03/2024</a:t>
+              <a:t>04/13/2024</a:t>
             </a:fld>
             <a:endParaRPr lang="en-IL"/>
           </a:p>
@@ -9253,7 +9253,7 @@
           <a:p>
             <a:fld id="{56332E43-BAAC-405E-8CED-B029CA0EF2C0}" type="datetimeFigureOut">
               <a:rPr lang="en-US" smtClean="0"/>
-              <a:t>4/3/2024</a:t>
+              <a:t>4/13/2024</a:t>
             </a:fld>
             <a:endParaRPr lang="en-US"/>
           </a:p>
@@ -9504,7 +9504,7 @@
           <a:p>
             <a:fld id="{56332E43-BAAC-405E-8CED-B029CA0EF2C0}" type="datetimeFigureOut">
               <a:rPr lang="en-US" smtClean="0"/>
-              <a:t>4/3/2024</a:t>
+              <a:t>4/13/2024</a:t>
             </a:fld>
             <a:endParaRPr lang="en-US"/>
           </a:p>
@@ -9818,7 +9818,7 @@
           <a:p>
             <a:fld id="{56332E43-BAAC-405E-8CED-B029CA0EF2C0}" type="datetimeFigureOut">
               <a:rPr lang="en-US" smtClean="0"/>
-              <a:t>4/3/2024</a:t>
+              <a:t>4/13/2024</a:t>
             </a:fld>
             <a:endParaRPr lang="en-US"/>
           </a:p>
@@ -10159,7 +10159,7 @@
           <a:p>
             <a:fld id="{56332E43-BAAC-405E-8CED-B029CA0EF2C0}" type="datetimeFigureOut">
               <a:rPr lang="en-US" smtClean="0"/>
-              <a:t>4/3/2024</a:t>
+              <a:t>4/13/2024</a:t>
             </a:fld>
             <a:endParaRPr lang="en-US"/>
           </a:p>
@@ -10473,7 +10473,7 @@
           <a:p>
             <a:fld id="{56332E43-BAAC-405E-8CED-B029CA0EF2C0}" type="datetimeFigureOut">
               <a:rPr lang="en-US" smtClean="0"/>
-              <a:t>4/3/2024</a:t>
+              <a:t>4/13/2024</a:t>
             </a:fld>
             <a:endParaRPr lang="en-US"/>
           </a:p>
@@ -10866,7 +10866,7 @@
           <a:p>
             <a:fld id="{56332E43-BAAC-405E-8CED-B029CA0EF2C0}" type="datetimeFigureOut">
               <a:rPr lang="en-US" smtClean="0"/>
-              <a:t>4/3/2024</a:t>
+              <a:t>4/13/2024</a:t>
             </a:fld>
             <a:endParaRPr lang="en-US"/>
           </a:p>
@@ -11036,7 +11036,7 @@
           <a:p>
             <a:fld id="{56332E43-BAAC-405E-8CED-B029CA0EF2C0}" type="datetimeFigureOut">
               <a:rPr lang="en-US" smtClean="0"/>
-              <a:t>4/3/2024</a:t>
+              <a:t>4/13/2024</a:t>
             </a:fld>
             <a:endParaRPr lang="en-US"/>
           </a:p>
@@ -11216,7 +11216,7 @@
           <a:p>
             <a:fld id="{56332E43-BAAC-405E-8CED-B029CA0EF2C0}" type="datetimeFigureOut">
               <a:rPr lang="en-US" smtClean="0"/>
-              <a:t>4/3/2024</a:t>
+              <a:t>4/13/2024</a:t>
             </a:fld>
             <a:endParaRPr lang="en-US"/>
           </a:p>
@@ -11392,7 +11392,7 @@
           <a:p>
             <a:fld id="{56332E43-BAAC-405E-8CED-B029CA0EF2C0}" type="datetimeFigureOut">
               <a:rPr lang="en-US" smtClean="0"/>
-              <a:t>4/3/2024</a:t>
+              <a:t>4/13/2024</a:t>
             </a:fld>
             <a:endParaRPr lang="en-US"/>
           </a:p>
@@ -11639,7 +11639,7 @@
           <a:p>
             <a:fld id="{56332E43-BAAC-405E-8CED-B029CA0EF2C0}" type="datetimeFigureOut">
               <a:rPr lang="en-US" smtClean="0"/>
-              <a:t>4/3/2024</a:t>
+              <a:t>4/13/2024</a:t>
             </a:fld>
             <a:endParaRPr lang="en-US"/>
           </a:p>
@@ -11871,7 +11871,7 @@
           <a:p>
             <a:fld id="{56332E43-BAAC-405E-8CED-B029CA0EF2C0}" type="datetimeFigureOut">
               <a:rPr lang="en-US" smtClean="0"/>
-              <a:t>4/3/2024</a:t>
+              <a:t>4/13/2024</a:t>
             </a:fld>
             <a:endParaRPr lang="en-US"/>
           </a:p>
@@ -12245,7 +12245,7 @@
           <a:p>
             <a:fld id="{56332E43-BAAC-405E-8CED-B029CA0EF2C0}" type="datetimeFigureOut">
               <a:rPr lang="en-US" smtClean="0"/>
-              <a:t>4/3/2024</a:t>
+              <a:t>4/13/2024</a:t>
             </a:fld>
             <a:endParaRPr lang="en-US"/>
           </a:p>
@@ -12368,7 +12368,7 @@
           <a:p>
             <a:fld id="{56332E43-BAAC-405E-8CED-B029CA0EF2C0}" type="datetimeFigureOut">
               <a:rPr lang="en-US" smtClean="0"/>
-              <a:t>4/3/2024</a:t>
+              <a:t>4/13/2024</a:t>
             </a:fld>
             <a:endParaRPr lang="en-US"/>
           </a:p>
@@ -12463,7 +12463,7 @@
           <a:p>
             <a:fld id="{56332E43-BAAC-405E-8CED-B029CA0EF2C0}" type="datetimeFigureOut">
               <a:rPr lang="en-US" smtClean="0"/>
-              <a:t>4/3/2024</a:t>
+              <a:t>4/13/2024</a:t>
             </a:fld>
             <a:endParaRPr lang="en-US"/>
           </a:p>
@@ -12718,7 +12718,7 @@
           <a:p>
             <a:fld id="{56332E43-BAAC-405E-8CED-B029CA0EF2C0}" type="datetimeFigureOut">
               <a:rPr lang="en-US" smtClean="0"/>
-              <a:t>4/3/2024</a:t>
+              <a:t>4/13/2024</a:t>
             </a:fld>
             <a:endParaRPr lang="en-US"/>
           </a:p>
@@ -12981,7 +12981,7 @@
           <a:p>
             <a:fld id="{56332E43-BAAC-405E-8CED-B029CA0EF2C0}" type="datetimeFigureOut">
               <a:rPr lang="en-US" smtClean="0"/>
-              <a:t>4/3/2024</a:t>
+              <a:t>4/13/2024</a:t>
             </a:fld>
             <a:endParaRPr lang="en-US"/>
           </a:p>
@@ -13724,7 +13724,7 @@
           <a:p>
             <a:fld id="{56332E43-BAAC-405E-8CED-B029CA0EF2C0}" type="datetimeFigureOut">
               <a:rPr lang="en-US" smtClean="0"/>
-              <a:t>4/3/2024</a:t>
+              <a:t>4/13/2024</a:t>
             </a:fld>
             <a:endParaRPr lang="en-US"/>
           </a:p>
@@ -16393,7 +16393,7 @@
         <p:spPr>
           <a:xfrm>
             <a:off x="640080" y="325369"/>
-            <a:ext cx="5539656" cy="1956841"/>
+            <a:ext cx="7869936" cy="1956841"/>
           </a:xfrm>
         </p:spPr>
         <p:txBody>
@@ -16404,7 +16404,7 @@
           <a:p>
             <a:r>
               <a:rPr lang="en-US" sz="5400" dirty="0"/>
-              <a:t>Reinforcement learning 	</a:t>
+              <a:t>Reinforcement learning Deep Q-Learning</a:t>
             </a:r>
           </a:p>
         </p:txBody>
@@ -16437,110 +16437,91 @@
           </a:bodyPr>
           <a:lstStyle/>
           <a:p>
+            <a:pPr algn="l">
+              <a:buFont typeface="Arial" panose="020B0604020202020204" pitchFamily="34" charset="0"/>
+              <a:buChar char="•"/>
+            </a:pPr>
+            <a:endParaRPr lang="en-US" sz="2000" b="0" i="0" dirty="0">
+              <a:solidFill>
+                <a:srgbClr val="0D0D0D"/>
+              </a:solidFill>
+              <a:effectLst/>
+              <a:highlight>
+                <a:srgbClr val="FFFFFF"/>
+              </a:highlight>
+              <a:latin typeface="Söhne"/>
+            </a:endParaRPr>
+          </a:p>
+          <a:p>
             <a:r>
-              <a:rPr lang="en-US" sz="2200" dirty="0"/>
-              <a:t>Overview -  State:</a:t>
+              <a:rPr lang="en-US" sz="2000" b="0" i="0" dirty="0">
+                <a:solidFill>
+                  <a:srgbClr val="0D0D0D"/>
+                </a:solidFill>
+                <a:effectLst/>
+                <a:highlight>
+                  <a:srgbClr val="FFFFFF"/>
+                </a:highlight>
+                <a:latin typeface="Söhne"/>
+              </a:rPr>
+              <a:t>Implemented DQN-based controller for single drone</a:t>
             </a:r>
-            <a:br>
-              <a:rPr lang="en-US" sz="2200" dirty="0"/>
-            </a:br>
-            <a:r>
-              <a:rPr lang="en-US" sz="2200" dirty="0"/>
-              <a:t>	</a:t>
-            </a:r>
-          </a:p>
-          <a:p>
-            <a:pPr lvl="1"/>
-            <a:r>
-              <a:rPr lang="en-US" sz="2000" dirty="0">
-                <a:latin typeface="+mj-lt"/>
-              </a:rPr>
-              <a:t>18 radar features (6 regions * 3 scopes) +</a:t>
-            </a:r>
-          </a:p>
-          <a:p>
-            <a:pPr marL="457200" lvl="1" indent="0">
-              <a:buNone/>
-            </a:pPr>
-            <a:r>
-              <a:rPr lang="en-US" sz="2000" dirty="0">
-                <a:latin typeface="+mj-lt"/>
-              </a:rPr>
-              <a:t>	</a:t>
-            </a:r>
-            <a:r>
-              <a:rPr lang="en-US" sz="2000" dirty="0" err="1">
-                <a:latin typeface="+mj-lt"/>
-              </a:rPr>
-              <a:t>relative_angle</a:t>
-            </a:r>
-            <a:r>
-              <a:rPr lang="en-US" sz="2000" dirty="0">
-                <a:latin typeface="+mj-lt"/>
-              </a:rPr>
-              <a:t>, </a:t>
-            </a:r>
-            <a:r>
-              <a:rPr lang="en-US" sz="2000" dirty="0" err="1">
-                <a:latin typeface="+mj-lt"/>
-              </a:rPr>
-              <a:t>velocity_magnitude</a:t>
-            </a:r>
-            <a:r>
-              <a:rPr lang="en-US" sz="2000" dirty="0">
-                <a:latin typeface="+mj-lt"/>
-              </a:rPr>
-              <a:t>, </a:t>
-            </a:r>
-            <a:r>
-              <a:rPr lang="en-US" sz="2000" dirty="0" err="1">
-                <a:latin typeface="+mj-lt"/>
-              </a:rPr>
-              <a:t>target_magnitude</a:t>
-            </a:r>
-            <a:r>
-              <a:rPr lang="en-US" sz="2000" dirty="0">
-                <a:latin typeface="+mj-lt"/>
-              </a:rPr>
-              <a:t>,</a:t>
-            </a:r>
+          </a:p>
+          <a:p>
             <a:r>
               <a:rPr lang="en-US" sz="2000" dirty="0">
                 <a:solidFill>
-                  <a:srgbClr val="BCBEC4"/>
+                  <a:srgbClr val="0D0D0D"/>
+                </a:solidFill>
+                <a:highlight>
+                  <a:srgbClr val="FFFFFF"/>
+                </a:highlight>
+                <a:latin typeface="Söhne"/>
+              </a:rPr>
+              <a:t>48-hour training period yielded minimal progress</a:t>
+            </a:r>
+          </a:p>
+          <a:p>
+            <a:r>
+              <a:rPr lang="en-US" sz="2000" dirty="0">
+                <a:solidFill>
+                  <a:srgbClr val="0D0D0D"/>
+                </a:solidFill>
+                <a:highlight>
+                  <a:srgbClr val="FFFFFF"/>
+                </a:highlight>
+                <a:latin typeface="Söhne"/>
+              </a:rPr>
+              <a:t>DQN framework unsuitable due to extensive action vector</a:t>
+            </a:r>
+          </a:p>
+          <a:p>
+            <a:r>
+              <a:rPr lang="en-US" sz="2000" b="0" i="0" dirty="0">
+                <a:solidFill>
+                  <a:srgbClr val="0D0D0D"/>
                 </a:solidFill>
                 <a:effectLst/>
-                <a:latin typeface="+mj-lt"/>
+                <a:highlight>
+                  <a:srgbClr val="FFFFFF"/>
+                </a:highlight>
+                <a:latin typeface="Söhne"/>
               </a:rPr>
-              <a:t> 	</a:t>
+              <a:t>Drone proficient in avoiding collisions, but unable to reach destination</a:t>
             </a:r>
-            <a:r>
-              <a:rPr lang="en-US" sz="2000" dirty="0" err="1">
-                <a:latin typeface="+mj-lt"/>
-              </a:rPr>
-              <a:t>target_angle</a:t>
-            </a:r>
+          </a:p>
+          <a:p>
             <a:r>
               <a:rPr lang="en-US" sz="2000" dirty="0">
-                <a:latin typeface="+mj-lt"/>
+                <a:solidFill>
+                  <a:srgbClr val="0D0D0D"/>
+                </a:solidFill>
+                <a:highlight>
+                  <a:srgbClr val="FFFFFF"/>
+                </a:highlight>
+                <a:latin typeface="Söhne"/>
               </a:rPr>
-              <a:t>, </a:t>
-            </a:r>
-            <a:r>
-              <a:rPr lang="en-US" sz="2000" dirty="0" err="1">
-                <a:latin typeface="+mj-lt"/>
-              </a:rPr>
-              <a:t>battery_level</a:t>
-            </a:r>
-            <a:endParaRPr lang="en-US" sz="2000" dirty="0">
-              <a:latin typeface="+mj-lt"/>
-            </a:endParaRPr>
-          </a:p>
-          <a:p>
-            <a:pPr lvl="1"/>
-            <a:r>
-              <a:rPr lang="en-US" sz="2000" dirty="0"/>
-              <a:t>Each feature is normalized.</a:t>
+              <a:t>Conclusion: DQN inadequate for nuanced problem requirements</a:t>
             </a:r>
             <a:br>
               <a:rPr lang="en-US" sz="2000" dirty="0"/>
@@ -16589,41 +16570,6 @@
       </p:grpSpPr>
       <p:sp>
         <p:nvSpPr>
-          <p:cNvPr id="2" name="Title 1">
-            <a:extLst>
-              <a:ext uri="{FF2B5EF4-FFF2-40B4-BE49-F238E27FC236}">
-                <a16:creationId xmlns:a16="http://schemas.microsoft.com/office/drawing/2014/main" id="{A50DB624-D8D6-1306-C7DA-1C1970C82928}"/>
-              </a:ext>
-            </a:extLst>
-          </p:cNvPr>
-          <p:cNvSpPr>
-            <a:spLocks noGrp="1"/>
-          </p:cNvSpPr>
-          <p:nvPr>
-            <p:ph type="title"/>
-          </p:nvPr>
-        </p:nvSpPr>
-        <p:spPr>
-          <a:xfrm>
-            <a:off x="640080" y="325369"/>
-            <a:ext cx="5539656" cy="1956841"/>
-          </a:xfrm>
-        </p:spPr>
-        <p:txBody>
-          <a:bodyPr anchor="b">
-            <a:normAutofit/>
-          </a:bodyPr>
-          <a:lstStyle/>
-          <a:p>
-            <a:r>
-              <a:rPr lang="en-US" sz="5400" dirty="0"/>
-              <a:t>Reinforcement learning 	</a:t>
-            </a:r>
-          </a:p>
-        </p:txBody>
-      </p:sp>
-      <p:sp>
-        <p:nvSpPr>
           <p:cNvPr id="3" name="Content Placeholder 2">
             <a:extLst>
               <a:ext uri="{FF2B5EF4-FFF2-40B4-BE49-F238E27FC236}">
@@ -16646,76 +16592,274 @@
         </p:spPr>
         <p:txBody>
           <a:bodyPr>
+            <a:normAutofit fontScale="92500" lnSpcReduction="20000"/>
+          </a:bodyPr>
+          <a:lstStyle/>
+          <a:p>
+            <a:r>
+              <a:rPr lang="en-US" sz="2000" dirty="0">
+                <a:solidFill>
+                  <a:srgbClr val="0D0D0D"/>
+                </a:solidFill>
+                <a:highlight>
+                  <a:srgbClr val="FFFFFF"/>
+                </a:highlight>
+                <a:latin typeface="Söhne"/>
+              </a:rPr>
+              <a:t>Utilized KD-Q-Learning for agent training</a:t>
+            </a:r>
+          </a:p>
+          <a:p>
+            <a:r>
+              <a:rPr lang="en-US" sz="2000" dirty="0">
+                <a:solidFill>
+                  <a:srgbClr val="0D0D0D"/>
+                </a:solidFill>
+                <a:highlight>
+                  <a:srgbClr val="FFFFFF"/>
+                </a:highlight>
+                <a:latin typeface="Söhne"/>
+              </a:rPr>
+              <a:t>Some improvement observed in the learning process</a:t>
+            </a:r>
+          </a:p>
+          <a:p>
+            <a:r>
+              <a:rPr lang="en-US" sz="2000" dirty="0">
+                <a:solidFill>
+                  <a:srgbClr val="0D0D0D"/>
+                </a:solidFill>
+                <a:highlight>
+                  <a:srgbClr val="FFFFFF"/>
+                </a:highlight>
+                <a:latin typeface="Söhne"/>
+              </a:rPr>
+              <a:t>Drone adept at avoiding buildings but failed to reach the destination or avoid other drones</a:t>
+            </a:r>
+          </a:p>
+          <a:p>
+            <a:r>
+              <a:rPr lang="en-US" sz="2000" dirty="0">
+                <a:solidFill>
+                  <a:srgbClr val="0D0D0D"/>
+                </a:solidFill>
+                <a:highlight>
+                  <a:srgbClr val="FFFFFF"/>
+                </a:highlight>
+                <a:latin typeface="Söhne"/>
+              </a:rPr>
+              <a:t>Primary reason: inability to reach the intended destination</a:t>
+            </a:r>
+          </a:p>
+          <a:p>
+            <a:r>
+              <a:rPr lang="en-US" sz="2000" dirty="0">
+                <a:solidFill>
+                  <a:srgbClr val="0D0D0D"/>
+                </a:solidFill>
+                <a:highlight>
+                  <a:srgbClr val="FFFFFF"/>
+                </a:highlight>
+                <a:latin typeface="Söhne"/>
+              </a:rPr>
+              <a:t>Challenge: classification of actions for a given state</a:t>
+            </a:r>
+          </a:p>
+          <a:p>
+            <a:r>
+              <a:rPr lang="en-US" sz="2000" dirty="0">
+                <a:solidFill>
+                  <a:srgbClr val="0D0D0D"/>
+                </a:solidFill>
+                <a:highlight>
+                  <a:srgbClr val="FFFFFF"/>
+                </a:highlight>
+                <a:latin typeface="Söhne"/>
+              </a:rPr>
+              <a:t>KD-tree similarity treatment resulted in difficulty distinguishing obstacle encounters</a:t>
+            </a:r>
+          </a:p>
+          <a:p>
+            <a:r>
+              <a:rPr lang="en-US" sz="2000" dirty="0">
+                <a:solidFill>
+                  <a:srgbClr val="0D0D0D"/>
+                </a:solidFill>
+                <a:highlight>
+                  <a:srgbClr val="FFFFFF"/>
+                </a:highlight>
+                <a:latin typeface="Söhne"/>
+              </a:rPr>
+              <a:t>Consequently, the agent struggled with accurate actions, especially navigation</a:t>
+            </a:r>
+          </a:p>
+          <a:p>
+            <a:r>
+              <a:rPr lang="en-US" sz="2000" dirty="0">
+                <a:solidFill>
+                  <a:srgbClr val="0D0D0D"/>
+                </a:solidFill>
+                <a:highlight>
+                  <a:srgbClr val="FFFFFF"/>
+                </a:highlight>
+                <a:latin typeface="Söhne"/>
+              </a:rPr>
+              <a:t>KD-Q-Learning is effective in obstacle avoidance but inadequate for precise destination navigation</a:t>
+            </a:r>
+          </a:p>
+          <a:p>
+            <a:endParaRPr lang="en-US" sz="2000" dirty="0"/>
+          </a:p>
+        </p:txBody>
+      </p:sp>
+      <p:sp>
+        <p:nvSpPr>
+          <p:cNvPr id="6" name="Title 1">
+            <a:extLst>
+              <a:ext uri="{FF2B5EF4-FFF2-40B4-BE49-F238E27FC236}">
+                <a16:creationId xmlns:a16="http://schemas.microsoft.com/office/drawing/2014/main" id="{280CA9D7-C666-1EBE-082B-750682930A1F}"/>
+              </a:ext>
+            </a:extLst>
+          </p:cNvPr>
+          <p:cNvSpPr txBox="1">
+            <a:spLocks/>
+          </p:cNvSpPr>
+          <p:nvPr/>
+        </p:nvSpPr>
+        <p:spPr>
+          <a:xfrm>
+            <a:off x="640080" y="325369"/>
+            <a:ext cx="7869936" cy="1956841"/>
+          </a:xfrm>
+          <a:prstGeom prst="rect">
+            <a:avLst/>
+          </a:prstGeom>
+        </p:spPr>
+        <p:txBody>
+          <a:bodyPr vert="horz" lIns="91440" tIns="45720" rIns="91440" bIns="45720" rtlCol="0" anchor="b">
             <a:normAutofit/>
           </a:bodyPr>
-          <a:lstStyle/>
+          <a:lstStyle>
+            <a:lvl1pPr algn="l" defTabSz="457200" rtl="0" eaLnBrk="1" latinLnBrk="0" hangingPunct="1">
+              <a:spcBef>
+                <a:spcPct val="0"/>
+              </a:spcBef>
+              <a:buNone/>
+              <a:defRPr sz="3600" kern="1200">
+                <a:solidFill>
+                  <a:schemeClr val="accent1"/>
+                </a:solidFill>
+                <a:latin typeface="+mj-lt"/>
+                <a:ea typeface="+mj-ea"/>
+                <a:cs typeface="+mj-cs"/>
+              </a:defRPr>
+            </a:lvl1pPr>
+            <a:lvl2pPr eaLnBrk="1" hangingPunct="1">
+              <a:defRPr>
+                <a:solidFill>
+                  <a:schemeClr val="tx2"/>
+                </a:solidFill>
+              </a:defRPr>
+            </a:lvl2pPr>
+            <a:lvl3pPr eaLnBrk="1" hangingPunct="1">
+              <a:defRPr>
+                <a:solidFill>
+                  <a:schemeClr val="tx2"/>
+                </a:solidFill>
+              </a:defRPr>
+            </a:lvl3pPr>
+            <a:lvl4pPr eaLnBrk="1" hangingPunct="1">
+              <a:defRPr>
+                <a:solidFill>
+                  <a:schemeClr val="tx2"/>
+                </a:solidFill>
+              </a:defRPr>
+            </a:lvl4pPr>
+            <a:lvl5pPr eaLnBrk="1" hangingPunct="1">
+              <a:defRPr>
+                <a:solidFill>
+                  <a:schemeClr val="tx2"/>
+                </a:solidFill>
+              </a:defRPr>
+            </a:lvl5pPr>
+            <a:lvl6pPr eaLnBrk="1" hangingPunct="1">
+              <a:defRPr>
+                <a:solidFill>
+                  <a:schemeClr val="tx2"/>
+                </a:solidFill>
+              </a:defRPr>
+            </a:lvl6pPr>
+            <a:lvl7pPr eaLnBrk="1" hangingPunct="1">
+              <a:defRPr>
+                <a:solidFill>
+                  <a:schemeClr val="tx2"/>
+                </a:solidFill>
+              </a:defRPr>
+            </a:lvl7pPr>
+            <a:lvl8pPr eaLnBrk="1" hangingPunct="1">
+              <a:defRPr>
+                <a:solidFill>
+                  <a:schemeClr val="tx2"/>
+                </a:solidFill>
+              </a:defRPr>
+            </a:lvl8pPr>
+            <a:lvl9pPr eaLnBrk="1" hangingPunct="1">
+              <a:defRPr>
+                <a:solidFill>
+                  <a:schemeClr val="tx2"/>
+                </a:solidFill>
+              </a:defRPr>
+            </a:lvl9pPr>
+          </a:lstStyle>
           <a:p>
             <a:r>
-              <a:rPr lang="en-US" sz="2200" dirty="0"/>
-              <a:t>Overview -  Reward:</a:t>
+              <a:rPr lang="en-US" sz="5400" dirty="0"/>
+              <a:t>Reinforcement learning KD-Tree Q-Learning</a:t>
             </a:r>
-            <a:br>
-              <a:rPr lang="en-US" sz="2200" dirty="0"/>
-            </a:br>
-            <a:r>
-              <a:rPr lang="en-US" sz="2200" dirty="0"/>
-              <a:t>	</a:t>
-            </a:r>
-          </a:p>
-          <a:p>
-            <a:pPr lvl="1"/>
-            <a:r>
-              <a:rPr lang="en-US" sz="2000" dirty="0"/>
-              <a:t>Terminate episode if : out of bounds\ hit obstacle (-1000000)</a:t>
-            </a:r>
-          </a:p>
-          <a:p>
-            <a:pPr marL="457200" lvl="1" indent="0">
-              <a:buNone/>
-            </a:pPr>
-            <a:r>
-              <a:rPr lang="en-US" sz="2000" dirty="0"/>
-              <a:t>	or if meet target (+1000000)</a:t>
-            </a:r>
-          </a:p>
-          <a:p>
-            <a:pPr lvl="1"/>
-            <a:r>
-              <a:rPr lang="en-US" sz="2000" dirty="0"/>
-              <a:t>O.W reward = (90-abs(</a:t>
-            </a:r>
-            <a:r>
-              <a:rPr lang="en-US" sz="2000" dirty="0" err="1"/>
-              <a:t>relative_angle</a:t>
-            </a:r>
-            <a:r>
-              <a:rPr lang="en-US" sz="2000" dirty="0"/>
-              <a:t>)*100)*</a:t>
-            </a:r>
-            <a:r>
-              <a:rPr lang="en-US" sz="2000" dirty="0" err="1"/>
-              <a:t>velocity_magnitude</a:t>
-            </a:r>
-            <a:endParaRPr lang="en-US" sz="2000" dirty="0"/>
-          </a:p>
-          <a:p>
-            <a:pPr lvl="1"/>
-            <a:r>
-              <a:rPr lang="en-US" sz="2000" dirty="0"/>
-              <a:t>(we did handle it, so it’ll reach target with minimal velocity)</a:t>
-            </a:r>
-          </a:p>
-          <a:p>
-            <a:pPr marL="457200" lvl="1" indent="0">
-              <a:buNone/>
-            </a:pPr>
-            <a:br>
-              <a:rPr lang="en-US" sz="2000" dirty="0"/>
-            </a:br>
-            <a:endParaRPr lang="en-US" sz="2000" dirty="0"/>
           </a:p>
         </p:txBody>
       </p:sp>
+      <p:pic>
+        <p:nvPicPr>
+          <p:cNvPr id="7" name="Picture 6" descr="kD Trees">
+            <a:extLst>
+              <a:ext uri="{FF2B5EF4-FFF2-40B4-BE49-F238E27FC236}">
+                <a16:creationId xmlns:a16="http://schemas.microsoft.com/office/drawing/2014/main" id="{D6863CB0-7642-170C-F716-FDB34F1938CF}"/>
+              </a:ext>
+            </a:extLst>
+          </p:cNvPr>
+          <p:cNvPicPr>
+            <a:picLocks noChangeAspect="1"/>
+          </p:cNvPicPr>
+          <p:nvPr/>
+        </p:nvPicPr>
+        <p:blipFill>
+          <a:blip r:embed="rId2">
+            <a:extLst>
+              <a:ext uri="{28A0092B-C50C-407E-A947-70E740481C1C}">
+                <a14:useLocalDpi xmlns:a14="http://schemas.microsoft.com/office/drawing/2010/main" val="0"/>
+              </a:ext>
+            </a:extLst>
+          </a:blip>
+          <a:srcRect/>
+          <a:stretch>
+            <a:fillRect/>
+          </a:stretch>
+        </p:blipFill>
+        <p:spPr bwMode="auto">
+          <a:xfrm>
+            <a:off x="8206105" y="1303789"/>
+            <a:ext cx="3846257" cy="1956841"/>
+          </a:xfrm>
+          <a:prstGeom prst="rect">
+            <a:avLst/>
+          </a:prstGeom>
+          <a:noFill/>
+          <a:ln>
+            <a:noFill/>
+          </a:ln>
+        </p:spPr>
+      </p:pic>
     </p:spTree>
     <p:extLst>
       <p:ext uri="{BB962C8B-B14F-4D97-AF65-F5344CB8AC3E}">
@@ -16773,7 +16917,7 @@
         <p:spPr>
           <a:xfrm>
             <a:off x="640080" y="325369"/>
-            <a:ext cx="5539656" cy="1956841"/>
+            <a:ext cx="5539656" cy="1064519"/>
           </a:xfrm>
         </p:spPr>
         <p:txBody>
@@ -16784,7 +16928,7 @@
           <a:p>
             <a:r>
               <a:rPr lang="en-US" sz="5400" dirty="0"/>
-              <a:t>Reinforcement learning 	</a:t>
+              <a:t>conclusion	</a:t>
             </a:r>
           </a:p>
         </p:txBody>
@@ -16813,86 +16957,106 @@
         </p:spPr>
         <p:txBody>
           <a:bodyPr>
-            <a:normAutofit fontScale="70000" lnSpcReduction="20000"/>
+            <a:normAutofit/>
           </a:bodyPr>
           <a:lstStyle/>
           <a:p>
             <a:r>
-              <a:rPr lang="en-US" sz="3100" dirty="0"/>
-              <a:t>Main Challenge - State Space. (~23^100)</a:t>
+              <a:rPr lang="en-US" sz="2000" dirty="0">
+                <a:solidFill>
+                  <a:srgbClr val="0D0D0D"/>
+                </a:solidFill>
+                <a:highlight>
+                  <a:srgbClr val="FFFFFF"/>
+                </a:highlight>
+                <a:latin typeface="Söhne"/>
+              </a:rPr>
+              <a:t>Introduction of novel training approach</a:t>
             </a:r>
           </a:p>
           <a:p>
-            <a:pPr marL="0" indent="0">
-              <a:buNone/>
-            </a:pPr>
             <a:r>
-              <a:rPr lang="en-US" sz="3100" dirty="0"/>
-              <a:t>	</a:t>
+              <a:rPr lang="en-US" sz="2000" dirty="0">
+                <a:solidFill>
+                  <a:srgbClr val="0D0D0D"/>
+                </a:solidFill>
+                <a:highlight>
+                  <a:srgbClr val="FFFFFF"/>
+                </a:highlight>
+                <a:latin typeface="Söhne"/>
+              </a:rPr>
+              <a:t>Centralized controller manages all drones in simulation</a:t>
             </a:r>
           </a:p>
           <a:p>
             <a:r>
-              <a:rPr lang="en-US" sz="3100" dirty="0"/>
-              <a:t>In order to train the agents (currently one at a time).</a:t>
+              <a:rPr lang="en-US" sz="2000" dirty="0">
+                <a:solidFill>
+                  <a:srgbClr val="0D0D0D"/>
+                </a:solidFill>
+                <a:highlight>
+                  <a:srgbClr val="FFFFFF"/>
+                </a:highlight>
+                <a:latin typeface="Söhne"/>
+              </a:rPr>
+              <a:t>Preflight phase involves map transformation into a 3D graph</a:t>
             </a:r>
-            <a:br>
-              <a:rPr lang="en-US" sz="3100" dirty="0"/>
-            </a:br>
+          </a:p>
+          <a:p>
             <a:r>
-              <a:rPr lang="en-US" sz="3100" dirty="0"/>
-              <a:t>We tried to utilize two methods – </a:t>
+              <a:rPr lang="en-US" sz="2000" dirty="0">
+                <a:solidFill>
+                  <a:srgbClr val="0D0D0D"/>
+                </a:solidFill>
+                <a:highlight>
+                  <a:srgbClr val="FFFFFF"/>
+                </a:highlight>
+                <a:latin typeface="Söhne"/>
+              </a:rPr>
+              <a:t>Controller calculates the shortest path for each drone</a:t>
             </a:r>
-            <a:br>
-              <a:rPr lang="en-US" sz="2200" dirty="0"/>
-            </a:br>
-            <a:endParaRPr lang="en-US" sz="2400" dirty="0"/>
-          </a:p>
-          <a:p>
-            <a:pPr lvl="1"/>
+          </a:p>
+          <a:p>
             <a:r>
-              <a:rPr lang="en-US" sz="2400" dirty="0"/>
-              <a:t>Solution 1: Deep Q-Learning, we manage to create all the infrastructure, but the model did not converge.</a:t>
+              <a:rPr lang="en-US" sz="2000" dirty="0">
+                <a:solidFill>
+                  <a:srgbClr val="0D0D0D"/>
+                </a:solidFill>
+                <a:highlight>
+                  <a:srgbClr val="FFFFFF"/>
+                </a:highlight>
+                <a:latin typeface="Söhne"/>
+              </a:rPr>
+              <a:t>Supervisory role during drone flights, ensuring adherence to designated paths</a:t>
             </a:r>
           </a:p>
           <a:p>
-            <a:pPr lvl="1"/>
             <a:r>
-              <a:rPr lang="en-US" sz="2400" dirty="0"/>
-              <a:t>Solution 2: Q-Learning, with special data structure that will reduce the number of states the agent will calc for every run. (evolution </a:t>
+              <a:rPr lang="en-US" sz="2000" dirty="0">
+                <a:solidFill>
+                  <a:srgbClr val="0D0D0D"/>
+                </a:solidFill>
+                <a:highlight>
+                  <a:srgbClr val="FFFFFF"/>
+                </a:highlight>
+                <a:latin typeface="Söhne"/>
+              </a:rPr>
+              <a:t>KD-Q-Learning utilized for collision avoidance</a:t>
             </a:r>
+          </a:p>
+          <a:p>
             <a:r>
-              <a:rPr lang="en-US" sz="2400" dirty="0" err="1"/>
-              <a:t>kd</a:t>
+              <a:rPr lang="en-US" sz="2000" dirty="0">
+                <a:solidFill>
+                  <a:srgbClr val="0D0D0D"/>
+                </a:solidFill>
+                <a:highlight>
+                  <a:srgbClr val="FFFFFF"/>
+                </a:highlight>
+                <a:latin typeface="Söhne"/>
+              </a:rPr>
+              <a:t>Controller trained to minimize deviations from shortest paths and avoid collisions</a:t>
             </a:r>
-            <a:r>
-              <a:rPr lang="en-US" sz="2400" dirty="0"/>
-              <a:t>-tree)</a:t>
-            </a:r>
-          </a:p>
-          <a:p>
-            <a:pPr marL="457200" lvl="1" indent="0">
-              <a:buNone/>
-            </a:pPr>
-            <a:br>
-              <a:rPr lang="en-US" sz="2000" dirty="0"/>
-            </a:br>
-            <a:r>
-              <a:rPr lang="en-US" sz="2000" dirty="0"/>
-              <a:t>	</a:t>
-            </a:r>
-          </a:p>
-          <a:p>
-            <a:pPr marL="0" indent="0">
-              <a:buNone/>
-            </a:pPr>
-            <a:r>
-              <a:rPr lang="en-US" sz="2200" dirty="0"/>
-              <a:t>	</a:t>
-            </a:r>
-            <a:br>
-              <a:rPr lang="en-US" sz="2000" dirty="0"/>
-            </a:br>
             <a:endParaRPr lang="en-US" sz="2000" dirty="0"/>
           </a:p>
         </p:txBody>

</xml_diff>

<commit_message>
fixed docs before review
</commit_message>
<xml_diff>
--- a/Docs/Project_601.pptx
+++ b/Docs/Project_601.pptx
@@ -2699,15 +2699,15 @@
     <dgm:cxn modelId="{F600BF1B-28A6-7540-A4ED-79A26F78E40D}" type="presOf" srcId="{BBCEB914-6A20-4D4C-B68C-4463DAD087AC}" destId="{60886B65-FBD7-3244-B035-C27610542378}" srcOrd="0" destOrd="0" presId="urn:microsoft.com/office/officeart/2005/8/layout/hierarchy1"/>
     <dgm:cxn modelId="{F2211033-DAA5-4013-BB28-6BE7B56C3ADE}" srcId="{A0C052F7-8892-41EC-8574-9D187E83A1F4}" destId="{11FBABEF-6C42-4A6F-BCA2-F180F73FA1CA}" srcOrd="2" destOrd="0" parTransId="{F8BA1E54-2E61-4053-8994-F14D29BFC330}" sibTransId="{C6BE0FAE-2162-412F-B29C-991C2B6D5E64}"/>
     <dgm:cxn modelId="{BEDB1A3F-5FC8-474E-9F5B-C96E7DE85544}" type="presOf" srcId="{A0C052F7-8892-41EC-8574-9D187E83A1F4}" destId="{528D0D30-2D33-4EC2-AD47-2F7ABB88FBED}" srcOrd="0" destOrd="0" presId="urn:microsoft.com/office/officeart/2005/8/layout/hierarchy1"/>
+    <dgm:cxn modelId="{A272935B-B37E-014D-9978-7EA572AAB369}" type="presOf" srcId="{94C49DB8-46D8-4526-A99A-7DE191796341}" destId="{A457EF02-6141-BD41-B5FB-062B73745800}" srcOrd="0" destOrd="0" presId="urn:microsoft.com/office/officeart/2005/8/layout/hierarchy1"/>
     <dgm:cxn modelId="{E0844C43-9D34-274F-A66D-7400F160C813}" type="presOf" srcId="{D30E055E-D607-49F8-85CD-B84BB4CE6177}" destId="{99AC887F-33B1-5C4B-A7EA-E6254A4B2B6D}" srcOrd="0" destOrd="0" presId="urn:microsoft.com/office/officeart/2005/8/layout/hierarchy1"/>
     <dgm:cxn modelId="{4CDDB545-85AB-4E6D-8603-0AED309A93DB}" srcId="{E23C31D8-D3AC-425A-AAB0-275257CEEBA5}" destId="{74CEB8FD-15FF-412A-9600-8271050BED58}" srcOrd="3" destOrd="0" parTransId="{076117A5-CE37-4461-A9CB-732EDE5945BE}" sibTransId="{A02A87E7-AA65-4156-BD9A-490DB22929CE}"/>
     <dgm:cxn modelId="{825EBD48-6CE0-5A45-93A8-47003CBB260E}" type="presOf" srcId="{0128EE23-9AAA-49DE-A11C-D667C6948C9E}" destId="{424A924C-A6C9-7E49-A58A-5491C147BDA0}" srcOrd="0" destOrd="0" presId="urn:microsoft.com/office/officeart/2005/8/layout/hierarchy1"/>
+    <dgm:cxn modelId="{14EBCB6B-FA8C-493A-A420-C4ACDA651630}" srcId="{E23C31D8-D3AC-425A-AAB0-275257CEEBA5}" destId="{BBCEB914-6A20-4D4C-B68C-4463DAD087AC}" srcOrd="0" destOrd="0" parTransId="{E3B1403E-AB6F-4FCF-AD1E-F3CE23E9E79A}" sibTransId="{78ADBFA3-758A-4356-B2F6-BCB278DE751C}"/>
     <dgm:cxn modelId="{33F00A4F-191F-4916-8B03-ABDC6BA36EE4}" srcId="{78843328-906C-4924-BD0D-2FB02D997F23}" destId="{6796CB94-8280-43F3-AAA0-6734710FAFF4}" srcOrd="0" destOrd="0" parTransId="{CD756865-78CE-44C1-811F-E0312E421B0E}" sibTransId="{D61EB397-9B5D-4F6D-AF9A-52382DBB3E06}"/>
+    <dgm:cxn modelId="{758AFC71-CE51-B24F-8982-9F1E0D546FDC}" type="presOf" srcId="{7ABDAF2D-7AB6-4B4C-AA93-A07C5C1188AF}" destId="{383B2FC9-B311-4A4F-B20C-2AD448DEF120}" srcOrd="0" destOrd="0" presId="urn:microsoft.com/office/officeart/2005/8/layout/hierarchy1"/>
     <dgm:cxn modelId="{3D34E853-D3DF-A046-8EE0-C2CE8F2C9324}" type="presOf" srcId="{78843328-906C-4924-BD0D-2FB02D997F23}" destId="{52354F52-903C-964E-9C70-F0085EDCEA54}" srcOrd="0" destOrd="0" presId="urn:microsoft.com/office/officeart/2005/8/layout/hierarchy1"/>
     <dgm:cxn modelId="{CF978D59-11CE-9940-89C5-745F9CE321E4}" type="presOf" srcId="{F6742098-15D4-40B6-851F-521E7185192E}" destId="{F91058B3-518B-9B4B-9248-C5D4B7CD7348}" srcOrd="0" destOrd="0" presId="urn:microsoft.com/office/officeart/2005/8/layout/hierarchy1"/>
-    <dgm:cxn modelId="{A272935B-B37E-014D-9978-7EA572AAB369}" type="presOf" srcId="{94C49DB8-46D8-4526-A99A-7DE191796341}" destId="{A457EF02-6141-BD41-B5FB-062B73745800}" srcOrd="0" destOrd="0" presId="urn:microsoft.com/office/officeart/2005/8/layout/hierarchy1"/>
-    <dgm:cxn modelId="{14EBCB6B-FA8C-493A-A420-C4ACDA651630}" srcId="{E23C31D8-D3AC-425A-AAB0-275257CEEBA5}" destId="{BBCEB914-6A20-4D4C-B68C-4463DAD087AC}" srcOrd="0" destOrd="0" parTransId="{E3B1403E-AB6F-4FCF-AD1E-F3CE23E9E79A}" sibTransId="{78ADBFA3-758A-4356-B2F6-BCB278DE751C}"/>
-    <dgm:cxn modelId="{758AFC71-CE51-B24F-8982-9F1E0D546FDC}" type="presOf" srcId="{7ABDAF2D-7AB6-4B4C-AA93-A07C5C1188AF}" destId="{383B2FC9-B311-4A4F-B20C-2AD448DEF120}" srcOrd="0" destOrd="0" presId="urn:microsoft.com/office/officeart/2005/8/layout/hierarchy1"/>
     <dgm:cxn modelId="{0304028C-B252-4FB7-9558-1DA3CE6CDD9E}" srcId="{74CEB8FD-15FF-412A-9600-8271050BED58}" destId="{78843328-906C-4924-BD0D-2FB02D997F23}" srcOrd="0" destOrd="0" parTransId="{1426985E-D600-4C00-A345-1C80A96A5A22}" sibTransId="{019820A1-D751-48A0-9A21-2EA031DC25AC}"/>
     <dgm:cxn modelId="{A5882390-D9C1-4720-8D45-259C74AAFA08}" srcId="{A0C052F7-8892-41EC-8574-9D187E83A1F4}" destId="{E23C31D8-D3AC-425A-AAB0-275257CEEBA5}" srcOrd="0" destOrd="0" parTransId="{77626A35-49F4-4ABA-8F34-22446395EF85}" sibTransId="{7C7A2E0A-5E04-4E24-BB90-BEFD65F0D78A}"/>
     <dgm:cxn modelId="{2E219198-6410-094A-AAF7-2472C39A95BD}" type="presOf" srcId="{CD756865-78CE-44C1-811F-E0312E421B0E}" destId="{7E2B656D-C82E-8444-99CA-19D3B6FACA64}" srcOrd="0" destOrd="0" presId="urn:microsoft.com/office/officeart/2005/8/layout/hierarchy1"/>
@@ -8296,7 +8296,7 @@
           <a:p>
             <a:fld id="{B3B7A677-FBB3-1E46-8BD0-0AD2CBC8FEDE}" type="datetimeFigureOut">
               <a:rPr lang="en-IL" smtClean="0"/>
-              <a:t>18/04/2024</a:t>
+              <a:t>04/19/2024</a:t>
             </a:fld>
             <a:endParaRPr lang="en-IL"/>
           </a:p>
@@ -9371,7 +9371,7 @@
           <a:p>
             <a:fld id="{56332E43-BAAC-405E-8CED-B029CA0EF2C0}" type="datetimeFigureOut">
               <a:rPr lang="en-US" smtClean="0"/>
-              <a:t>4/18/24</a:t>
+              <a:t>4/19/2024</a:t>
             </a:fld>
             <a:endParaRPr lang="en-US"/>
           </a:p>
@@ -9622,7 +9622,7 @@
           <a:p>
             <a:fld id="{56332E43-BAAC-405E-8CED-B029CA0EF2C0}" type="datetimeFigureOut">
               <a:rPr lang="en-US" smtClean="0"/>
-              <a:t>4/18/24</a:t>
+              <a:t>4/19/2024</a:t>
             </a:fld>
             <a:endParaRPr lang="en-US"/>
           </a:p>
@@ -9936,7 +9936,7 @@
           <a:p>
             <a:fld id="{56332E43-BAAC-405E-8CED-B029CA0EF2C0}" type="datetimeFigureOut">
               <a:rPr lang="en-US" smtClean="0"/>
-              <a:t>4/18/24</a:t>
+              <a:t>4/19/2024</a:t>
             </a:fld>
             <a:endParaRPr lang="en-US"/>
           </a:p>
@@ -10277,7 +10277,7 @@
           <a:p>
             <a:fld id="{56332E43-BAAC-405E-8CED-B029CA0EF2C0}" type="datetimeFigureOut">
               <a:rPr lang="en-US" smtClean="0"/>
-              <a:t>4/18/24</a:t>
+              <a:t>4/19/2024</a:t>
             </a:fld>
             <a:endParaRPr lang="en-US"/>
           </a:p>
@@ -10591,7 +10591,7 @@
           <a:p>
             <a:fld id="{56332E43-BAAC-405E-8CED-B029CA0EF2C0}" type="datetimeFigureOut">
               <a:rPr lang="en-US" smtClean="0"/>
-              <a:t>4/18/24</a:t>
+              <a:t>4/19/2024</a:t>
             </a:fld>
             <a:endParaRPr lang="en-US"/>
           </a:p>
@@ -10984,7 +10984,7 @@
           <a:p>
             <a:fld id="{56332E43-BAAC-405E-8CED-B029CA0EF2C0}" type="datetimeFigureOut">
               <a:rPr lang="en-US" smtClean="0"/>
-              <a:t>4/18/24</a:t>
+              <a:t>4/19/2024</a:t>
             </a:fld>
             <a:endParaRPr lang="en-US"/>
           </a:p>
@@ -11154,7 +11154,7 @@
           <a:p>
             <a:fld id="{56332E43-BAAC-405E-8CED-B029CA0EF2C0}" type="datetimeFigureOut">
               <a:rPr lang="en-US" smtClean="0"/>
-              <a:t>4/18/24</a:t>
+              <a:t>4/19/2024</a:t>
             </a:fld>
             <a:endParaRPr lang="en-US"/>
           </a:p>
@@ -11334,7 +11334,7 @@
           <a:p>
             <a:fld id="{56332E43-BAAC-405E-8CED-B029CA0EF2C0}" type="datetimeFigureOut">
               <a:rPr lang="en-US" smtClean="0"/>
-              <a:t>4/18/24</a:t>
+              <a:t>4/19/2024</a:t>
             </a:fld>
             <a:endParaRPr lang="en-US"/>
           </a:p>
@@ -11510,7 +11510,7 @@
           <a:p>
             <a:fld id="{56332E43-BAAC-405E-8CED-B029CA0EF2C0}" type="datetimeFigureOut">
               <a:rPr lang="en-US" smtClean="0"/>
-              <a:t>4/18/24</a:t>
+              <a:t>4/19/2024</a:t>
             </a:fld>
             <a:endParaRPr lang="en-US"/>
           </a:p>
@@ -11757,7 +11757,7 @@
           <a:p>
             <a:fld id="{56332E43-BAAC-405E-8CED-B029CA0EF2C0}" type="datetimeFigureOut">
               <a:rPr lang="en-US" smtClean="0"/>
-              <a:t>4/18/24</a:t>
+              <a:t>4/19/2024</a:t>
             </a:fld>
             <a:endParaRPr lang="en-US"/>
           </a:p>
@@ -11989,7 +11989,7 @@
           <a:p>
             <a:fld id="{56332E43-BAAC-405E-8CED-B029CA0EF2C0}" type="datetimeFigureOut">
               <a:rPr lang="en-US" smtClean="0"/>
-              <a:t>4/18/24</a:t>
+              <a:t>4/19/2024</a:t>
             </a:fld>
             <a:endParaRPr lang="en-US"/>
           </a:p>
@@ -12363,7 +12363,7 @@
           <a:p>
             <a:fld id="{56332E43-BAAC-405E-8CED-B029CA0EF2C0}" type="datetimeFigureOut">
               <a:rPr lang="en-US" smtClean="0"/>
-              <a:t>4/18/24</a:t>
+              <a:t>4/19/2024</a:t>
             </a:fld>
             <a:endParaRPr lang="en-US"/>
           </a:p>
@@ -12486,7 +12486,7 @@
           <a:p>
             <a:fld id="{56332E43-BAAC-405E-8CED-B029CA0EF2C0}" type="datetimeFigureOut">
               <a:rPr lang="en-US" smtClean="0"/>
-              <a:t>4/18/24</a:t>
+              <a:t>4/19/2024</a:t>
             </a:fld>
             <a:endParaRPr lang="en-US"/>
           </a:p>
@@ -12581,7 +12581,7 @@
           <a:p>
             <a:fld id="{56332E43-BAAC-405E-8CED-B029CA0EF2C0}" type="datetimeFigureOut">
               <a:rPr lang="en-US" smtClean="0"/>
-              <a:t>4/18/24</a:t>
+              <a:t>4/19/2024</a:t>
             </a:fld>
             <a:endParaRPr lang="en-US"/>
           </a:p>
@@ -12836,7 +12836,7 @@
           <a:p>
             <a:fld id="{56332E43-BAAC-405E-8CED-B029CA0EF2C0}" type="datetimeFigureOut">
               <a:rPr lang="en-US" smtClean="0"/>
-              <a:t>4/18/24</a:t>
+              <a:t>4/19/2024</a:t>
             </a:fld>
             <a:endParaRPr lang="en-US"/>
           </a:p>
@@ -13099,7 +13099,7 @@
           <a:p>
             <a:fld id="{56332E43-BAAC-405E-8CED-B029CA0EF2C0}" type="datetimeFigureOut">
               <a:rPr lang="en-US" smtClean="0"/>
-              <a:t>4/18/24</a:t>
+              <a:t>4/19/2024</a:t>
             </a:fld>
             <a:endParaRPr lang="en-US"/>
           </a:p>
@@ -13842,7 +13842,7 @@
           <a:p>
             <a:fld id="{56332E43-BAAC-405E-8CED-B029CA0EF2C0}" type="datetimeFigureOut">
               <a:rPr lang="en-US" smtClean="0"/>
-              <a:t>4/18/24</a:t>
+              <a:t>4/19/2024</a:t>
             </a:fld>
             <a:endParaRPr lang="en-US"/>
           </a:p>
@@ -17069,8 +17069,8 @@
         </p:nvSpPr>
         <p:spPr>
           <a:xfrm>
-            <a:off x="640080" y="2872899"/>
-            <a:ext cx="8785274" cy="3818458"/>
+            <a:off x="640080" y="2230734"/>
+            <a:ext cx="8785274" cy="4912799"/>
           </a:xfrm>
         </p:spPr>
         <p:txBody>
@@ -17089,7 +17089,7 @@
                 </a:highlight>
                 <a:latin typeface="Söhne"/>
               </a:rPr>
-              <a:t>Introduction of novel training approach</a:t>
+              <a:t>We created a centralized controller that manages all drones in the simulation</a:t>
             </a:r>
           </a:p>
           <a:p>
@@ -17103,7 +17103,7 @@
                 </a:highlight>
                 <a:latin typeface="Söhne"/>
               </a:rPr>
-              <a:t>Centralized controller manages all drones in simulation</a:t>
+              <a:t> The preflight phase involves map transformation into a 3D graph this stage takes some time for a new map.</a:t>
             </a:r>
           </a:p>
           <a:p>
@@ -17117,21 +17117,7 @@
                 </a:highlight>
                 <a:latin typeface="Söhne"/>
               </a:rPr>
-              <a:t>Preflight phase involves map transformation into a 3D graph</a:t>
-            </a:r>
-          </a:p>
-          <a:p>
-            <a:r>
-              <a:rPr lang="en-US" sz="2000" dirty="0">
-                <a:solidFill>
-                  <a:srgbClr val="0D0D0D"/>
-                </a:solidFill>
-                <a:highlight>
-                  <a:srgbClr val="FFFFFF"/>
-                </a:highlight>
-                <a:latin typeface="Söhne"/>
-              </a:rPr>
-              <a:t>Controller calculates the shortest path for each drone</a:t>
+              <a:t>Controller calculates the shortest path for each drone from the 3D graph</a:t>
             </a:r>
           </a:p>
           <a:p>
@@ -17159,10 +17145,11 @@
                 </a:highlight>
                 <a:latin typeface="Söhne"/>
               </a:rPr>
-              <a:t>KD-Q-Learning utilized for collision avoidance</a:t>
+              <a:t>Tasks:</a:t>
             </a:r>
           </a:p>
           <a:p>
+            <a:pPr lvl="1"/>
             <a:r>
               <a:rPr lang="en-US" sz="2000" dirty="0">
                 <a:solidFill>
@@ -17173,8 +17160,50 @@
                 </a:highlight>
                 <a:latin typeface="Söhne"/>
               </a:rPr>
-              <a:t>Controller trained to minimize deviations from shortest paths and avoid collisions</a:t>
+              <a:t>Implement collision detection algorithms for real-time avoidance.</a:t>
             </a:r>
+          </a:p>
+          <a:p>
+            <a:pPr lvl="1"/>
+            <a:r>
+              <a:rPr lang="en-US" sz="2000" dirty="0">
+                <a:solidFill>
+                  <a:srgbClr val="0D0D0D"/>
+                </a:solidFill>
+                <a:highlight>
+                  <a:srgbClr val="FFFFFF"/>
+                </a:highlight>
+                <a:latin typeface="Söhne"/>
+              </a:rPr>
+              <a:t>Enable the controller to guide drones in route deviation and collision avoidance.</a:t>
+            </a:r>
+          </a:p>
+          <a:p>
+            <a:pPr lvl="1"/>
+            <a:r>
+              <a:rPr lang="en-US" sz="2000" dirty="0">
+                <a:solidFill>
+                  <a:srgbClr val="0D0D0D"/>
+                </a:solidFill>
+                <a:highlight>
+                  <a:srgbClr val="FFFFFF"/>
+                </a:highlight>
+                <a:latin typeface="Söhne"/>
+              </a:rPr>
+              <a:t>Train the controller to allocate tasks based on drone capabilities and task requirements.</a:t>
+            </a:r>
+            <a:endParaRPr lang="en-US" b="0" i="0" dirty="0">
+              <a:solidFill>
+                <a:srgbClr val="0D0D0D"/>
+              </a:solidFill>
+              <a:effectLst/>
+              <a:highlight>
+                <a:srgbClr val="FFFFFF"/>
+              </a:highlight>
+              <a:latin typeface="Söhne"/>
+            </a:endParaRPr>
+          </a:p>
+          <a:p>
             <a:endParaRPr lang="en-US" sz="2000" dirty="0"/>
           </a:p>
         </p:txBody>

</xml_diff>